<commit_message>
Initial implementation of scalings for the 4-input model.
</commit_message>
<xml_diff>
--- a/Figures/model_schematics.pptx
+++ b/Figures/model_schematics.pptx
@@ -6,7 +6,8 @@
   </p:sldMasterIdLst>
   <p:sldIdLst>
     <p:sldId id="256" r:id="rId2"/>
-    <p:sldId id="257" r:id="rId3"/>
+    <p:sldId id="258" r:id="rId3"/>
+    <p:sldId id="257" r:id="rId4"/>
   </p:sldIdLst>
   <p:sldSz cx="12192000" cy="6858000"/>
   <p:notesSz cx="6858000" cy="9144000"/>
@@ -105,6 +106,11 @@
       </a:defRPr>
     </a:lvl9pPr>
   </p:defaultTextStyle>
+  <p:extLst>
+    <p:ext uri="{EFAFB233-063F-42B5-8137-9DF3F51BA10A}">
+      <p15:sldGuideLst xmlns:p15="http://schemas.microsoft.com/office/powerpoint/2012/main"/>
+    </p:ext>
+  </p:extLst>
 </p:presentation>
 </file>
 
@@ -255,7 +261,7 @@
           <a:p>
             <a:fld id="{FF177785-60D8-5045-B05A-6B1A42786AC9}" type="datetimeFigureOut">
               <a:rPr lang="en-US" smtClean="0"/>
-              <a:t>12/21/23</a:t>
+              <a:t>1/6/24</a:t>
             </a:fld>
             <a:endParaRPr lang="en-US"/>
           </a:p>
@@ -453,7 +459,7 @@
           <a:p>
             <a:fld id="{FF177785-60D8-5045-B05A-6B1A42786AC9}" type="datetimeFigureOut">
               <a:rPr lang="en-US" smtClean="0"/>
-              <a:t>12/21/23</a:t>
+              <a:t>1/6/24</a:t>
             </a:fld>
             <a:endParaRPr lang="en-US"/>
           </a:p>
@@ -661,7 +667,7 @@
           <a:p>
             <a:fld id="{FF177785-60D8-5045-B05A-6B1A42786AC9}" type="datetimeFigureOut">
               <a:rPr lang="en-US" smtClean="0"/>
-              <a:t>12/21/23</a:t>
+              <a:t>1/6/24</a:t>
             </a:fld>
             <a:endParaRPr lang="en-US"/>
           </a:p>
@@ -859,7 +865,7 @@
           <a:p>
             <a:fld id="{FF177785-60D8-5045-B05A-6B1A42786AC9}" type="datetimeFigureOut">
               <a:rPr lang="en-US" smtClean="0"/>
-              <a:t>12/21/23</a:t>
+              <a:t>1/6/24</a:t>
             </a:fld>
             <a:endParaRPr lang="en-US"/>
           </a:p>
@@ -1134,7 +1140,7 @@
           <a:p>
             <a:fld id="{FF177785-60D8-5045-B05A-6B1A42786AC9}" type="datetimeFigureOut">
               <a:rPr lang="en-US" smtClean="0"/>
-              <a:t>12/21/23</a:t>
+              <a:t>1/6/24</a:t>
             </a:fld>
             <a:endParaRPr lang="en-US"/>
           </a:p>
@@ -1399,7 +1405,7 @@
           <a:p>
             <a:fld id="{FF177785-60D8-5045-B05A-6B1A42786AC9}" type="datetimeFigureOut">
               <a:rPr lang="en-US" smtClean="0"/>
-              <a:t>12/21/23</a:t>
+              <a:t>1/6/24</a:t>
             </a:fld>
             <a:endParaRPr lang="en-US"/>
           </a:p>
@@ -1811,7 +1817,7 @@
           <a:p>
             <a:fld id="{FF177785-60D8-5045-B05A-6B1A42786AC9}" type="datetimeFigureOut">
               <a:rPr lang="en-US" smtClean="0"/>
-              <a:t>12/21/23</a:t>
+              <a:t>1/6/24</a:t>
             </a:fld>
             <a:endParaRPr lang="en-US"/>
           </a:p>
@@ -1952,7 +1958,7 @@
           <a:p>
             <a:fld id="{FF177785-60D8-5045-B05A-6B1A42786AC9}" type="datetimeFigureOut">
               <a:rPr lang="en-US" smtClean="0"/>
-              <a:t>12/21/23</a:t>
+              <a:t>1/6/24</a:t>
             </a:fld>
             <a:endParaRPr lang="en-US"/>
           </a:p>
@@ -2065,7 +2071,7 @@
           <a:p>
             <a:fld id="{FF177785-60D8-5045-B05A-6B1A42786AC9}" type="datetimeFigureOut">
               <a:rPr lang="en-US" smtClean="0"/>
-              <a:t>12/21/23</a:t>
+              <a:t>1/6/24</a:t>
             </a:fld>
             <a:endParaRPr lang="en-US"/>
           </a:p>
@@ -2376,7 +2382,7 @@
           <a:p>
             <a:fld id="{FF177785-60D8-5045-B05A-6B1A42786AC9}" type="datetimeFigureOut">
               <a:rPr lang="en-US" smtClean="0"/>
-              <a:t>12/21/23</a:t>
+              <a:t>1/6/24</a:t>
             </a:fld>
             <a:endParaRPr lang="en-US"/>
           </a:p>
@@ -2664,7 +2670,7 @@
           <a:p>
             <a:fld id="{FF177785-60D8-5045-B05A-6B1A42786AC9}" type="datetimeFigureOut">
               <a:rPr lang="en-US" smtClean="0"/>
-              <a:t>12/21/23</a:t>
+              <a:t>1/6/24</a:t>
             </a:fld>
             <a:endParaRPr lang="en-US"/>
           </a:p>
@@ -2905,7 +2911,7 @@
           <a:p>
             <a:fld id="{FF177785-60D8-5045-B05A-6B1A42786AC9}" type="datetimeFigureOut">
               <a:rPr lang="en-US" smtClean="0"/>
-              <a:t>12/21/23</a:t>
+              <a:t>1/6/24</a:t>
             </a:fld>
             <a:endParaRPr lang="en-US"/>
           </a:p>
@@ -3553,8 +3559,8 @@
             </a:p>
           </p:txBody>
         </p:sp>
-        <mc:AlternateContent xmlns:mc="http://schemas.openxmlformats.org/markup-compatibility/2006">
-          <mc:Choice xmlns:a14="http://schemas.microsoft.com/office/drawing/2010/main" Requires="a14">
+        <mc:AlternateContent xmlns:mc="http://schemas.openxmlformats.org/markup-compatibility/2006" xmlns:a14="http://schemas.microsoft.com/office/drawing/2010/main">
+          <mc:Choice Requires="a14">
             <p:sp>
               <p:nvSpPr>
                 <p:cNvPr id="7" name="Oval 6">
@@ -3620,7 +3626,7 @@
               </p:txBody>
             </p:sp>
           </mc:Choice>
-          <mc:Fallback>
+          <mc:Fallback xmlns="">
             <p:sp>
               <p:nvSpPr>
                 <p:cNvPr id="7" name="Oval 6">
@@ -4125,10 +4131,10 @@
       </p:grpSpPr>
       <p:grpSp>
         <p:nvGrpSpPr>
-          <p:cNvPr id="19" name="Group 18">
-            <a:extLst>
-              <a:ext uri="{FF2B5EF4-FFF2-40B4-BE49-F238E27FC236}">
-                <a16:creationId xmlns:a16="http://schemas.microsoft.com/office/drawing/2014/main" id="{B9822AAA-A83F-A435-CA01-4CFFB9C805FF}"/>
+          <p:cNvPr id="15" name="Group 14">
+            <a:extLst>
+              <a:ext uri="{FF2B5EF4-FFF2-40B4-BE49-F238E27FC236}">
+                <a16:creationId xmlns:a16="http://schemas.microsoft.com/office/drawing/2014/main" id="{92781416-BDC4-4B97-5E6A-73896DB4AFDC}"/>
               </a:ext>
             </a:extLst>
           </p:cNvPr>
@@ -4138,6 +4144,422 @@
         <p:grpSpPr>
           <a:xfrm>
             <a:off x="1320800" y="990600"/>
+            <a:ext cx="6697133" cy="4597400"/>
+            <a:chOff x="1320800" y="990600"/>
+            <a:chExt cx="6697133" cy="4597400"/>
+          </a:xfrm>
+        </p:grpSpPr>
+        <p:grpSp>
+          <p:nvGrpSpPr>
+            <p:cNvPr id="4" name="Group 3">
+              <a:extLst>
+                <a:ext uri="{FF2B5EF4-FFF2-40B4-BE49-F238E27FC236}">
+                  <a16:creationId xmlns:a16="http://schemas.microsoft.com/office/drawing/2014/main" id="{05926622-6523-4C7C-623E-C8BEE71A17CD}"/>
+                </a:ext>
+              </a:extLst>
+            </p:cNvPr>
+            <p:cNvGrpSpPr/>
+            <p:nvPr/>
+          </p:nvGrpSpPr>
+          <p:grpSpPr>
+            <a:xfrm>
+              <a:off x="1320800" y="990600"/>
+              <a:ext cx="6697133" cy="4597400"/>
+              <a:chOff x="948267" y="270933"/>
+              <a:chExt cx="6697133" cy="4597400"/>
+            </a:xfrm>
+          </p:grpSpPr>
+          <p:sp>
+            <p:nvSpPr>
+              <p:cNvPr id="5" name="Rectangle 4">
+                <a:extLst>
+                  <a:ext uri="{FF2B5EF4-FFF2-40B4-BE49-F238E27FC236}">
+                    <a16:creationId xmlns:a16="http://schemas.microsoft.com/office/drawing/2014/main" id="{2218E670-FE41-A5C9-A497-6AA349B00555}"/>
+                  </a:ext>
+                </a:extLst>
+              </p:cNvPr>
+              <p:cNvSpPr/>
+              <p:nvPr/>
+            </p:nvSpPr>
+            <p:spPr>
+              <a:xfrm>
+                <a:off x="948267" y="270933"/>
+                <a:ext cx="6697133" cy="4597400"/>
+              </a:xfrm>
+              <a:prstGeom prst="rect">
+                <a:avLst/>
+              </a:prstGeom>
+              <a:solidFill>
+                <a:schemeClr val="accent6">
+                  <a:lumMod val="20000"/>
+                  <a:lumOff val="80000"/>
+                </a:schemeClr>
+              </a:solidFill>
+              <a:ln>
+                <a:solidFill>
+                  <a:schemeClr val="accent6">
+                    <a:lumMod val="20000"/>
+                    <a:lumOff val="80000"/>
+                  </a:schemeClr>
+                </a:solidFill>
+              </a:ln>
+            </p:spPr>
+            <p:style>
+              <a:lnRef idx="1">
+                <a:schemeClr val="accent3"/>
+              </a:lnRef>
+              <a:fillRef idx="2">
+                <a:schemeClr val="accent3"/>
+              </a:fillRef>
+              <a:effectRef idx="1">
+                <a:schemeClr val="accent3"/>
+              </a:effectRef>
+              <a:fontRef idx="minor">
+                <a:schemeClr val="dk1"/>
+              </a:fontRef>
+            </p:style>
+            <p:txBody>
+              <a:bodyPr rtlCol="0" anchor="ctr"/>
+              <a:lstStyle/>
+              <a:p>
+                <a:pPr algn="ctr"/>
+                <a:endParaRPr lang="en-US"/>
+              </a:p>
+            </p:txBody>
+          </p:sp>
+          <p:sp>
+            <p:nvSpPr>
+              <p:cNvPr id="6" name="Oval 5">
+                <a:extLst>
+                  <a:ext uri="{FF2B5EF4-FFF2-40B4-BE49-F238E27FC236}">
+                    <a16:creationId xmlns:a16="http://schemas.microsoft.com/office/drawing/2014/main" id="{76BCC38D-3F34-8445-0BA2-90751891E3A7}"/>
+                  </a:ext>
+                </a:extLst>
+              </p:cNvPr>
+              <p:cNvSpPr>
+                <a:spLocks noChangeAspect="1"/>
+              </p:cNvSpPr>
+              <p:nvPr/>
+            </p:nvSpPr>
+            <p:spPr>
+              <a:xfrm>
+                <a:off x="1500471" y="2203446"/>
+                <a:ext cx="540000" cy="541867"/>
+              </a:xfrm>
+              <a:prstGeom prst="ellipse">
+                <a:avLst/>
+              </a:prstGeom>
+            </p:spPr>
+            <p:style>
+              <a:lnRef idx="2">
+                <a:schemeClr val="accent3">
+                  <a:shade val="15000"/>
+                </a:schemeClr>
+              </a:lnRef>
+              <a:fillRef idx="1">
+                <a:schemeClr val="accent3"/>
+              </a:fillRef>
+              <a:effectRef idx="0">
+                <a:schemeClr val="accent3"/>
+              </a:effectRef>
+              <a:fontRef idx="minor">
+                <a:schemeClr val="lt1"/>
+              </a:fontRef>
+            </p:style>
+            <p:txBody>
+              <a:bodyPr rtlCol="0" anchor="ctr"/>
+              <a:lstStyle/>
+              <a:p>
+                <a:pPr algn="ctr"/>
+                <a:r>
+                  <a:rPr lang="en-US" sz="1400" dirty="0"/>
+                  <a:t>Re</a:t>
+                </a:r>
+              </a:p>
+            </p:txBody>
+          </p:sp>
+          <p:sp>
+            <p:nvSpPr>
+              <p:cNvPr id="10" name="Rectangle 9">
+                <a:extLst>
+                  <a:ext uri="{FF2B5EF4-FFF2-40B4-BE49-F238E27FC236}">
+                    <a16:creationId xmlns:a16="http://schemas.microsoft.com/office/drawing/2014/main" id="{DC3EE7D3-4468-90BC-F865-6DD2FA894AB2}"/>
+                  </a:ext>
+                </a:extLst>
+              </p:cNvPr>
+              <p:cNvSpPr/>
+              <p:nvPr/>
+            </p:nvSpPr>
+            <p:spPr>
+              <a:xfrm>
+                <a:off x="3301999" y="635000"/>
+                <a:ext cx="2633133" cy="3869267"/>
+              </a:xfrm>
+              <a:prstGeom prst="rect">
+                <a:avLst/>
+              </a:prstGeom>
+            </p:spPr>
+            <p:style>
+              <a:lnRef idx="2">
+                <a:schemeClr val="accent5">
+                  <a:shade val="15000"/>
+                </a:schemeClr>
+              </a:lnRef>
+              <a:fillRef idx="1">
+                <a:schemeClr val="accent5"/>
+              </a:fillRef>
+              <a:effectRef idx="0">
+                <a:schemeClr val="accent5"/>
+              </a:effectRef>
+              <a:fontRef idx="minor">
+                <a:schemeClr val="lt1"/>
+              </a:fontRef>
+            </p:style>
+            <p:txBody>
+              <a:bodyPr rtlCol="0" anchor="ctr"/>
+              <a:lstStyle/>
+              <a:p>
+                <a:pPr algn="ctr"/>
+                <a:r>
+                  <a:rPr lang="en-US" dirty="0"/>
+                  <a:t>FC Neural Net (8 layers)</a:t>
+                </a:r>
+              </a:p>
+            </p:txBody>
+          </p:sp>
+          <p:sp>
+            <p:nvSpPr>
+              <p:cNvPr id="11" name="Oval 10">
+                <a:extLst>
+                  <a:ext uri="{FF2B5EF4-FFF2-40B4-BE49-F238E27FC236}">
+                    <a16:creationId xmlns:a16="http://schemas.microsoft.com/office/drawing/2014/main" id="{0BA26F1C-5DC3-C9D2-8AFD-6AD7021A215D}"/>
+                  </a:ext>
+                </a:extLst>
+              </p:cNvPr>
+              <p:cNvSpPr>
+                <a:spLocks noChangeAspect="1"/>
+              </p:cNvSpPr>
+              <p:nvPr/>
+            </p:nvSpPr>
+            <p:spPr>
+              <a:xfrm>
+                <a:off x="6885271" y="2203447"/>
+                <a:ext cx="540000" cy="541867"/>
+              </a:xfrm>
+              <a:prstGeom prst="ellipse">
+                <a:avLst/>
+              </a:prstGeom>
+            </p:spPr>
+            <p:style>
+              <a:lnRef idx="2">
+                <a:schemeClr val="accent2">
+                  <a:shade val="15000"/>
+                </a:schemeClr>
+              </a:lnRef>
+              <a:fillRef idx="1">
+                <a:schemeClr val="accent2"/>
+              </a:fillRef>
+              <a:effectRef idx="0">
+                <a:schemeClr val="accent2"/>
+              </a:effectRef>
+              <a:fontRef idx="minor">
+                <a:schemeClr val="lt1"/>
+              </a:fontRef>
+            </p:style>
+            <p:txBody>
+              <a:bodyPr rtlCol="0" anchor="ctr"/>
+              <a:lstStyle/>
+              <a:p>
+                <a:pPr algn="ctr"/>
+                <a:r>
+                  <a:rPr lang="en-US" sz="1200" dirty="0"/>
+                  <a:t>C</a:t>
+                </a:r>
+                <a:r>
+                  <a:rPr lang="en-US" sz="1200" baseline="-25000" dirty="0"/>
+                  <a:t>D</a:t>
+                </a:r>
+              </a:p>
+            </p:txBody>
+          </p:sp>
+          <p:sp>
+            <p:nvSpPr>
+              <p:cNvPr id="12" name="Right Arrow 11">
+                <a:extLst>
+                  <a:ext uri="{FF2B5EF4-FFF2-40B4-BE49-F238E27FC236}">
+                    <a16:creationId xmlns:a16="http://schemas.microsoft.com/office/drawing/2014/main" id="{EB0BD9D1-8867-E6EB-A132-2290CAF08E37}"/>
+                  </a:ext>
+                </a:extLst>
+              </p:cNvPr>
+              <p:cNvSpPr/>
+              <p:nvPr/>
+            </p:nvSpPr>
+            <p:spPr>
+              <a:xfrm>
+                <a:off x="2260600" y="2298699"/>
+                <a:ext cx="618067" cy="351365"/>
+              </a:xfrm>
+              <a:prstGeom prst="rightArrow">
+                <a:avLst/>
+              </a:prstGeom>
+            </p:spPr>
+            <p:style>
+              <a:lnRef idx="2">
+                <a:schemeClr val="dk1">
+                  <a:shade val="15000"/>
+                </a:schemeClr>
+              </a:lnRef>
+              <a:fillRef idx="1">
+                <a:schemeClr val="dk1"/>
+              </a:fillRef>
+              <a:effectRef idx="0">
+                <a:schemeClr val="dk1"/>
+              </a:effectRef>
+              <a:fontRef idx="minor">
+                <a:schemeClr val="lt1"/>
+              </a:fontRef>
+            </p:style>
+            <p:txBody>
+              <a:bodyPr rtlCol="0" anchor="ctr"/>
+              <a:lstStyle/>
+              <a:p>
+                <a:pPr algn="ctr"/>
+                <a:endParaRPr lang="en-US"/>
+              </a:p>
+            </p:txBody>
+          </p:sp>
+          <p:sp>
+            <p:nvSpPr>
+              <p:cNvPr id="13" name="Right Arrow 12">
+                <a:extLst>
+                  <a:ext uri="{FF2B5EF4-FFF2-40B4-BE49-F238E27FC236}">
+                    <a16:creationId xmlns:a16="http://schemas.microsoft.com/office/drawing/2014/main" id="{069ECD81-A8CD-FF13-7242-CDE7740C4692}"/>
+                  </a:ext>
+                </a:extLst>
+              </p:cNvPr>
+              <p:cNvSpPr/>
+              <p:nvPr/>
+            </p:nvSpPr>
+            <p:spPr>
+              <a:xfrm>
+                <a:off x="6096000" y="2300813"/>
+                <a:ext cx="618067" cy="351365"/>
+              </a:xfrm>
+              <a:prstGeom prst="rightArrow">
+                <a:avLst/>
+              </a:prstGeom>
+            </p:spPr>
+            <p:style>
+              <a:lnRef idx="2">
+                <a:schemeClr val="dk1">
+                  <a:shade val="15000"/>
+                </a:schemeClr>
+              </a:lnRef>
+              <a:fillRef idx="1">
+                <a:schemeClr val="dk1"/>
+              </a:fillRef>
+              <a:effectRef idx="0">
+                <a:schemeClr val="dk1"/>
+              </a:effectRef>
+              <a:fontRef idx="minor">
+                <a:schemeClr val="lt1"/>
+              </a:fontRef>
+            </p:style>
+            <p:txBody>
+              <a:bodyPr rtlCol="0" anchor="ctr"/>
+              <a:lstStyle/>
+              <a:p>
+                <a:pPr algn="ctr"/>
+                <a:endParaRPr lang="en-US"/>
+              </a:p>
+            </p:txBody>
+          </p:sp>
+        </p:grpSp>
+        <p:sp>
+          <p:nvSpPr>
+            <p:cNvPr id="14" name="TextBox 13">
+              <a:extLst>
+                <a:ext uri="{FF2B5EF4-FFF2-40B4-BE49-F238E27FC236}">
+                  <a16:creationId xmlns:a16="http://schemas.microsoft.com/office/drawing/2014/main" id="{86EEFA17-B375-3E22-DF8D-C30AFA74B7A7}"/>
+                </a:ext>
+              </a:extLst>
+            </p:cNvPr>
+            <p:cNvSpPr txBox="1"/>
+            <p:nvPr/>
+          </p:nvSpPr>
+          <p:spPr>
+            <a:xfrm>
+              <a:off x="1532467" y="1083733"/>
+              <a:ext cx="1202266" cy="369332"/>
+            </a:xfrm>
+            <a:prstGeom prst="rect">
+              <a:avLst/>
+            </a:prstGeom>
+            <a:noFill/>
+          </p:spPr>
+          <p:txBody>
+            <a:bodyPr wrap="square" rtlCol="0">
+              <a:spAutoFit/>
+            </a:bodyPr>
+            <a:lstStyle/>
+            <a:p>
+              <a:r>
+                <a:rPr lang="en-US" b="1" dirty="0">
+                  <a:solidFill>
+                    <a:schemeClr val="accent2"/>
+                  </a:solidFill>
+                </a:rPr>
+                <a:t>Model 0</a:t>
+              </a:r>
+            </a:p>
+          </p:txBody>
+        </p:sp>
+      </p:grpSp>
+    </p:spTree>
+    <p:extLst>
+      <p:ext uri="{BB962C8B-B14F-4D97-AF65-F5344CB8AC3E}">
+        <p14:creationId xmlns:p14="http://schemas.microsoft.com/office/powerpoint/2010/main" val="3588058752"/>
+      </p:ext>
+    </p:extLst>
+  </p:cSld>
+  <p:clrMapOvr>
+    <a:masterClrMapping/>
+  </p:clrMapOvr>
+</p:sld>
+</file>
+
+<file path=ppt/slides/slide3.xml><?xml version="1.0" encoding="utf-8"?>
+<p:sld xmlns:a="http://schemas.openxmlformats.org/drawingml/2006/main" xmlns:r="http://schemas.openxmlformats.org/officeDocument/2006/relationships" xmlns:p="http://schemas.openxmlformats.org/presentationml/2006/main">
+  <p:cSld>
+    <p:spTree>
+      <p:nvGrpSpPr>
+        <p:cNvPr id="1" name=""/>
+        <p:cNvGrpSpPr/>
+        <p:nvPr/>
+      </p:nvGrpSpPr>
+      <p:grpSpPr>
+        <a:xfrm>
+          <a:off x="0" y="0"/>
+          <a:ext cx="0" cy="0"/>
+          <a:chOff x="0" y="0"/>
+          <a:chExt cx="0" cy="0"/>
+        </a:xfrm>
+      </p:grpSpPr>
+      <p:grpSp>
+        <p:nvGrpSpPr>
+          <p:cNvPr id="19" name="Group 18">
+            <a:extLst>
+              <a:ext uri="{FF2B5EF4-FFF2-40B4-BE49-F238E27FC236}">
+                <a16:creationId xmlns:a16="http://schemas.microsoft.com/office/drawing/2014/main" id="{B9822AAA-A83F-A435-CA01-4CFFB9C805FF}"/>
+              </a:ext>
+            </a:extLst>
+          </p:cNvPr>
+          <p:cNvGrpSpPr/>
+          <p:nvPr/>
+        </p:nvGrpSpPr>
+        <p:grpSpPr>
+          <a:xfrm>
+            <a:off x="1312333" y="990600"/>
             <a:ext cx="6697133" cy="4597400"/>
             <a:chOff x="948267" y="270933"/>
             <a:chExt cx="6697133" cy="4597400"/>
@@ -4354,8 +4776,8 @@
             </a:p>
           </p:txBody>
         </p:sp>
-        <mc:AlternateContent xmlns:mc="http://schemas.openxmlformats.org/markup-compatibility/2006">
-          <mc:Choice xmlns:a14="http://schemas.microsoft.com/office/drawing/2010/main" Requires="a14">
+        <mc:AlternateContent xmlns:mc="http://schemas.openxmlformats.org/markup-compatibility/2006" xmlns:a14="http://schemas.microsoft.com/office/drawing/2010/main">
+          <mc:Choice Requires="a14">
             <p:sp>
               <p:nvSpPr>
                 <p:cNvPr id="9" name="Oval 8">
@@ -4421,7 +4843,7 @@
               </p:txBody>
             </p:sp>
           </mc:Choice>
-          <mc:Fallback>
+          <mc:Fallback xmlns="">
             <p:sp>
               <p:nvSpPr>
                 <p:cNvPr id="9" name="Oval 8">
@@ -4677,7 +5099,7 @@
         </p:nvSpPr>
         <p:spPr>
           <a:xfrm>
-            <a:off x="1532467" y="1083733"/>
+            <a:off x="1524000" y="1083733"/>
             <a:ext cx="1202266" cy="369332"/>
           </a:xfrm>
           <a:prstGeom prst="rect">

</xml_diff>